<commit_message>
Fix comments image issue and update ppt
</commit_message>
<xml_diff>
--- a/tasty trails.pptx
+++ b/tasty trails.pptx
@@ -11,7 +11,8 @@
     <p:sldId id="259" r:id="rId5"/>
     <p:sldId id="261" r:id="rId6"/>
     <p:sldId id="263" r:id="rId7"/>
-    <p:sldId id="262" r:id="rId8"/>
+    <p:sldId id="264" r:id="rId8"/>
+    <p:sldId id="262" r:id="rId9"/>
   </p:sldIdLst>
   <p:sldSz cx="12192000" cy="6858000"/>
   <p:notesSz cx="6858000" cy="9144000"/>
@@ -110,6 +111,11 @@
       </a:defRPr>
     </a:lvl9pPr>
   </p:defaultTextStyle>
+  <p:extLst>
+    <p:ext uri="{EFAFB233-063F-42B5-8137-9DF3F51BA10A}">
+      <p15:sldGuideLst xmlns:p15="http://schemas.microsoft.com/office/powerpoint/2012/main"/>
+    </p:ext>
+  </p:extLst>
 </p:presentation>
 </file>
 
@@ -274,7 +280,7 @@
           <a:p>
             <a:fld id="{4E58042E-B02C-1C48-80EF-F4CB45199C19}" type="datetimeFigureOut">
               <a:rPr lang="en-US" smtClean="0"/>
-              <a:t>12/12/23</a:t>
+              <a:t>12/13/23</a:t>
             </a:fld>
             <a:endParaRPr lang="en-US"/>
           </a:p>
@@ -512,7 +518,7 @@
           <a:p>
             <a:fld id="{4E58042E-B02C-1C48-80EF-F4CB45199C19}" type="datetimeFigureOut">
               <a:rPr lang="en-US" smtClean="0"/>
-              <a:t>12/12/23</a:t>
+              <a:t>12/13/23</a:t>
             </a:fld>
             <a:endParaRPr lang="en-US"/>
           </a:p>
@@ -750,7 +756,7 @@
           <a:p>
             <a:fld id="{4E58042E-B02C-1C48-80EF-F4CB45199C19}" type="datetimeFigureOut">
               <a:rPr lang="en-US" smtClean="0"/>
-              <a:t>12/12/23</a:t>
+              <a:t>12/13/23</a:t>
             </a:fld>
             <a:endParaRPr lang="en-US"/>
           </a:p>
@@ -988,7 +994,7 @@
           <a:p>
             <a:fld id="{4E58042E-B02C-1C48-80EF-F4CB45199C19}" type="datetimeFigureOut">
               <a:rPr lang="en-US" smtClean="0"/>
-              <a:t>12/12/23</a:t>
+              <a:t>12/13/23</a:t>
             </a:fld>
             <a:endParaRPr lang="en-US"/>
           </a:p>
@@ -1293,7 +1299,7 @@
           <a:p>
             <a:fld id="{4E58042E-B02C-1C48-80EF-F4CB45199C19}" type="datetimeFigureOut">
               <a:rPr lang="en-US" smtClean="0"/>
-              <a:t>12/12/23</a:t>
+              <a:t>12/13/23</a:t>
             </a:fld>
             <a:endParaRPr lang="en-US"/>
           </a:p>
@@ -1596,7 +1602,7 @@
           <a:p>
             <a:fld id="{4E58042E-B02C-1C48-80EF-F4CB45199C19}" type="datetimeFigureOut">
               <a:rPr lang="en-US" smtClean="0"/>
-              <a:t>12/12/23</a:t>
+              <a:t>12/13/23</a:t>
             </a:fld>
             <a:endParaRPr lang="en-US"/>
           </a:p>
@@ -2047,7 +2053,7 @@
           <a:p>
             <a:fld id="{4E58042E-B02C-1C48-80EF-F4CB45199C19}" type="datetimeFigureOut">
               <a:rPr lang="en-US" smtClean="0"/>
-              <a:t>12/12/23</a:t>
+              <a:t>12/13/23</a:t>
             </a:fld>
             <a:endParaRPr lang="en-US"/>
           </a:p>
@@ -2220,7 +2226,7 @@
           <a:p>
             <a:fld id="{4E58042E-B02C-1C48-80EF-F4CB45199C19}" type="datetimeFigureOut">
               <a:rPr lang="en-US" smtClean="0"/>
-              <a:t>12/12/23</a:t>
+              <a:t>12/13/23</a:t>
             </a:fld>
             <a:endParaRPr lang="en-US"/>
           </a:p>
@@ -2357,7 +2363,7 @@
           <a:p>
             <a:fld id="{4E58042E-B02C-1C48-80EF-F4CB45199C19}" type="datetimeFigureOut">
               <a:rPr lang="en-US" smtClean="0"/>
-              <a:t>12/12/23</a:t>
+              <a:t>12/13/23</a:t>
             </a:fld>
             <a:endParaRPr lang="en-US"/>
           </a:p>
@@ -2701,7 +2707,7 @@
           <a:p>
             <a:fld id="{4E58042E-B02C-1C48-80EF-F4CB45199C19}" type="datetimeFigureOut">
               <a:rPr lang="en-US" smtClean="0"/>
-              <a:t>12/12/23</a:t>
+              <a:t>12/13/23</a:t>
             </a:fld>
             <a:endParaRPr lang="en-US"/>
           </a:p>
@@ -3022,7 +3028,7 @@
           <a:p>
             <a:fld id="{4E58042E-B02C-1C48-80EF-F4CB45199C19}" type="datetimeFigureOut">
               <a:rPr lang="en-US" smtClean="0"/>
-              <a:t>12/12/23</a:t>
+              <a:t>12/13/23</a:t>
             </a:fld>
             <a:endParaRPr lang="en-US"/>
           </a:p>
@@ -3279,7 +3285,7 @@
           <a:p>
             <a:fld id="{4E58042E-B02C-1C48-80EF-F4CB45199C19}" type="datetimeFigureOut">
               <a:rPr lang="en-US" smtClean="0"/>
-              <a:t>12/12/23</a:t>
+              <a:t>12/13/23</a:t>
             </a:fld>
             <a:endParaRPr lang="en-US"/>
           </a:p>
@@ -9459,6 +9465,196 @@
     <p:bg>
       <p:bgPr>
         <a:solidFill>
+          <a:schemeClr val="bg2">
+            <a:lumMod val="10000"/>
+          </a:schemeClr>
+        </a:solidFill>
+        <a:effectLst/>
+      </p:bgPr>
+    </p:bg>
+    <p:spTree>
+      <p:nvGrpSpPr>
+        <p:cNvPr id="1" name=""/>
+        <p:cNvGrpSpPr/>
+        <p:nvPr/>
+      </p:nvGrpSpPr>
+      <p:grpSpPr>
+        <a:xfrm>
+          <a:off x="0" y="0"/>
+          <a:ext cx="0" cy="0"/>
+          <a:chOff x="0" y="0"/>
+          <a:chExt cx="0" cy="0"/>
+        </a:xfrm>
+      </p:grpSpPr>
+      <p:pic>
+        <p:nvPicPr>
+          <p:cNvPr id="5" name="Graphic 4">
+            <a:extLst>
+              <a:ext uri="{FF2B5EF4-FFF2-40B4-BE49-F238E27FC236}">
+                <a16:creationId xmlns:a16="http://schemas.microsoft.com/office/drawing/2014/main" id="{B5387047-3634-1548-0DDB-9619EE8A4B34}"/>
+              </a:ext>
+            </a:extLst>
+          </p:cNvPr>
+          <p:cNvPicPr>
+            <a:picLocks noChangeAspect="1"/>
+          </p:cNvPicPr>
+          <p:nvPr/>
+        </p:nvPicPr>
+        <p:blipFill>
+          <a:blip r:embed="rId2">
+            <a:extLst>
+              <a:ext uri="{96DAC541-7B7A-43D3-8B79-37D633B846F1}">
+                <asvg:svgBlip xmlns:asvg="http://schemas.microsoft.com/office/drawing/2016/SVG/main" r:embed="rId3"/>
+              </a:ext>
+            </a:extLst>
+          </a:blip>
+          <a:stretch>
+            <a:fillRect/>
+          </a:stretch>
+        </p:blipFill>
+        <p:spPr>
+          <a:xfrm>
+            <a:off x="1338263" y="-1328737"/>
+            <a:ext cx="9515474" cy="9515474"/>
+          </a:xfrm>
+          <a:prstGeom prst="rect">
+            <a:avLst/>
+          </a:prstGeom>
+          <a:effectLst>
+            <a:outerShdw blurRad="50800" dist="140643" dir="5460000" algn="ctr" rotWithShape="0">
+              <a:srgbClr val="000000">
+                <a:alpha val="43137"/>
+              </a:srgbClr>
+            </a:outerShdw>
+            <a:reflection stA="33457" endPos="0" dist="78388" dir="5400000" sy="-100000" algn="bl" rotWithShape="0"/>
+          </a:effectLst>
+        </p:spPr>
+      </p:pic>
+      <p:sp>
+        <p:nvSpPr>
+          <p:cNvPr id="2" name="Google Shape;81;p16">
+            <a:extLst>
+              <a:ext uri="{FF2B5EF4-FFF2-40B4-BE49-F238E27FC236}">
+                <a16:creationId xmlns:a16="http://schemas.microsoft.com/office/drawing/2014/main" id="{2D27B622-1296-2FD6-8FA3-2C69B8893996}"/>
+              </a:ext>
+            </a:extLst>
+          </p:cNvPr>
+          <p:cNvSpPr txBox="1">
+            <a:spLocks/>
+          </p:cNvSpPr>
+          <p:nvPr/>
+        </p:nvSpPr>
+        <p:spPr>
+          <a:xfrm>
+            <a:off x="1338263" y="336883"/>
+            <a:ext cx="9109026" cy="500367"/>
+          </a:xfrm>
+          <a:prstGeom prst="rect">
+            <a:avLst/>
+          </a:prstGeom>
+        </p:spPr>
+        <p:txBody>
+          <a:bodyPr spcFirstLastPara="1" vert="horz" wrap="square" lIns="91425" tIns="91425" rIns="91425" bIns="91425" rtlCol="0" anchor="t" anchorCtr="0">
+            <a:noAutofit/>
+          </a:bodyPr>
+          <a:lstStyle>
+            <a:lvl1pPr algn="ctr" defTabSz="914400" rtl="0" eaLnBrk="1" latinLnBrk="0" hangingPunct="1">
+              <a:lnSpc>
+                <a:spcPct val="90000"/>
+              </a:lnSpc>
+              <a:spcBef>
+                <a:spcPct val="0"/>
+              </a:spcBef>
+              <a:buNone/>
+              <a:defRPr sz="6000" kern="1200">
+                <a:solidFill>
+                  <a:schemeClr val="tx1"/>
+                </a:solidFill>
+                <a:latin typeface="+mj-lt"/>
+                <a:ea typeface="+mj-ea"/>
+                <a:cs typeface="+mj-cs"/>
+              </a:defRPr>
+            </a:lvl1pPr>
+          </a:lstStyle>
+          <a:p>
+            <a:pPr>
+              <a:spcBef>
+                <a:spcPts val="0"/>
+              </a:spcBef>
+            </a:pPr>
+            <a:r>
+              <a:rPr lang="en-US" sz="3200" b="1" dirty="0">
+                <a:solidFill>
+                  <a:srgbClr val="D1D5DB"/>
+                </a:solidFill>
+                <a:latin typeface="Söhne"/>
+                <a:ea typeface="Lato"/>
+                <a:cs typeface="Lato"/>
+                <a:sym typeface="Lato"/>
+              </a:rPr>
+              <a:t>Progressive WEB Application</a:t>
+            </a:r>
+            <a:endParaRPr lang="en-US" sz="3200" b="1" dirty="0">
+              <a:solidFill>
+                <a:schemeClr val="bg1"/>
+              </a:solidFill>
+              <a:latin typeface="Lato"/>
+              <a:ea typeface="Lato"/>
+              <a:cs typeface="Lato"/>
+              <a:sym typeface="Lato"/>
+            </a:endParaRPr>
+          </a:p>
+        </p:txBody>
+      </p:sp>
+      <p:pic>
+        <p:nvPicPr>
+          <p:cNvPr id="9" name="Picture 8" descr="A screenshot of a login screen&#10;&#10;Description automatically generated">
+            <a:extLst>
+              <a:ext uri="{FF2B5EF4-FFF2-40B4-BE49-F238E27FC236}">
+                <a16:creationId xmlns:a16="http://schemas.microsoft.com/office/drawing/2014/main" id="{2B67C3A0-9F31-7695-18C9-F63C979640EE}"/>
+              </a:ext>
+            </a:extLst>
+          </p:cNvPr>
+          <p:cNvPicPr>
+            <a:picLocks noChangeAspect="1"/>
+          </p:cNvPicPr>
+          <p:nvPr/>
+        </p:nvPicPr>
+        <p:blipFill>
+          <a:blip r:embed="rId4"/>
+          <a:stretch>
+            <a:fillRect/>
+          </a:stretch>
+        </p:blipFill>
+        <p:spPr>
+          <a:xfrm>
+            <a:off x="1834985" y="1362020"/>
+            <a:ext cx="8522029" cy="4687414"/>
+          </a:xfrm>
+          <a:prstGeom prst="rect">
+            <a:avLst/>
+          </a:prstGeom>
+        </p:spPr>
+      </p:pic>
+    </p:spTree>
+    <p:extLst>
+      <p:ext uri="{BB962C8B-B14F-4D97-AF65-F5344CB8AC3E}">
+        <p14:creationId xmlns:p14="http://schemas.microsoft.com/office/powerpoint/2010/main" val="3753734243"/>
+      </p:ext>
+    </p:extLst>
+  </p:cSld>
+  <p:clrMapOvr>
+    <a:masterClrMapping/>
+  </p:clrMapOvr>
+</p:sld>
+</file>
+
+<file path=ppt/slides/slide8.xml><?xml version="1.0" encoding="utf-8"?>
+<p:sld xmlns:a="http://schemas.openxmlformats.org/drawingml/2006/main" xmlns:r="http://schemas.openxmlformats.org/officeDocument/2006/relationships" xmlns:p="http://schemas.openxmlformats.org/presentationml/2006/main">
+  <p:cSld>
+    <p:bg>
+      <p:bgPr>
+        <a:solidFill>
           <a:schemeClr val="bg1"/>
         </a:solidFill>
         <a:effectLst/>

</xml_diff>